<commit_message>
selhelp presentation for the seminar on 25.10.2023
</commit_message>
<xml_diff>
--- a/SelfHelp.pptx
+++ b/SelfHelp.pptx
@@ -224,7 +224,7 @@
           <a:p>
             <a:fld id="{A70AE70C-D509-4E4B-9352-79C3D11520D1}" type="datetimeFigureOut">
               <a:rPr lang="de-DE" smtClean="0"/>
-              <a:t>11.10.2021</a:t>
+              <a:t>11.10.2023</a:t>
             </a:fld>
             <a:endParaRPr lang="de-DE"/>
           </a:p>
@@ -402,7 +402,7 @@
           <a:p>
             <a:fld id="{B77602DA-7CEE-4298-AF4B-1C87D65BAB06}" type="datetimeFigureOut">
               <a:rPr lang="de-CH" smtClean="0"/>
-              <a:t>11.10.2021</a:t>
+              <a:t>11.10.2023</a:t>
             </a:fld>
             <a:endParaRPr lang="de-CH" dirty="0"/>
           </a:p>
@@ -716,11 +716,11 @@
           <a:lstStyle/>
           <a:p>
             <a:r>
-              <a:rPr lang="en-US" dirty="0" smtClean="0"/>
+              <a:rPr lang="en-US" dirty="0"/>
               <a:t>Created by Simon, 4 years ago</a:t>
             </a:r>
             <a:r>
-              <a:rPr lang="en-US" baseline="0" dirty="0" smtClean="0"/>
+              <a:rPr lang="en-US" baseline="0" dirty="0"/>
               <a:t> as a simple project requiring a web page for a self aided therapy. Then it expanded to a CMS tools designed for researchers. </a:t>
             </a:r>
             <a:endParaRPr lang="de-CH" dirty="0"/>
@@ -827,25 +827,17 @@
           <a:lstStyle/>
           <a:p>
             <a:r>
-              <a:rPr lang="en-US" dirty="0" smtClean="0"/>
+              <a:rPr lang="en-US" dirty="0"/>
               <a:t>Collected</a:t>
             </a:r>
             <a:r>
-              <a:rPr lang="en-US" baseline="0" dirty="0" smtClean="0"/>
-              <a:t> data dynamically change the view of the website. It can even </a:t>
-            </a:r>
-            <a:r>
-              <a:rPr lang="en-US" baseline="0" dirty="0" err="1" smtClean="0"/>
-              <a:t>trriger</a:t>
-            </a:r>
-            <a:r>
-              <a:rPr lang="en-US" baseline="0" dirty="0" smtClean="0"/>
-              <a:t> task as adding or removing permissions.</a:t>
-            </a:r>
-          </a:p>
-          <a:p>
-            <a:r>
-              <a:rPr lang="en-US" baseline="0" dirty="0" smtClean="0"/>
+              <a:rPr lang="en-US" baseline="0" dirty="0"/>
+              <a:t> data dynamically change the view of the website. It can even trigger task as adding or removing permissions.</a:t>
+            </a:r>
+          </a:p>
+          <a:p>
+            <a:r>
+              <a:rPr lang="en-US" baseline="0" dirty="0"/>
               <a:t>Sophie and Leon</a:t>
             </a:r>
             <a:endParaRPr lang="de-CH" dirty="0"/>
@@ -952,31 +944,31 @@
           <a:lstStyle/>
           <a:p>
             <a:r>
-              <a:rPr lang="en-US" dirty="0" smtClean="0"/>
+              <a:rPr lang="en-US" dirty="0"/>
               <a:t>Load static data and represent</a:t>
             </a:r>
             <a:r>
-              <a:rPr lang="en-US" baseline="0" dirty="0" smtClean="0"/>
+              <a:rPr lang="en-US" baseline="0" dirty="0"/>
               <a:t> it. </a:t>
             </a:r>
           </a:p>
           <a:p>
             <a:r>
-              <a:rPr lang="en-US" baseline="0" dirty="0" smtClean="0"/>
+              <a:rPr lang="en-US" baseline="0" dirty="0"/>
               <a:t>If you have any combination of these requirements, then </a:t>
             </a:r>
             <a:r>
-              <a:rPr lang="en-US" baseline="0" dirty="0" err="1" smtClean="0"/>
+              <a:rPr lang="en-US" baseline="0" dirty="0" err="1"/>
               <a:t>SelfHelp</a:t>
             </a:r>
             <a:r>
-              <a:rPr lang="en-US" baseline="0" dirty="0" smtClean="0"/>
+              <a:rPr lang="en-US" baseline="0" dirty="0"/>
               <a:t> will be the perfect tool for your project. </a:t>
             </a:r>
           </a:p>
           <a:p>
             <a:r>
-              <a:rPr lang="en-US" baseline="0" dirty="0" smtClean="0"/>
+              <a:rPr lang="en-US" baseline="0" dirty="0"/>
               <a:t>All these requirements are perfectly usable and rendered on mobile page but we further offer an option for a native android or iOS app that you can design, manage and change content without needs to contact any IT and you don’t need any programming skills at all.</a:t>
             </a:r>
           </a:p>
@@ -1082,41 +1074,41 @@
           <a:lstStyle/>
           <a:p>
             <a:r>
-              <a:rPr lang="en-US" dirty="0" smtClean="0"/>
+              <a:rPr lang="en-US" dirty="0"/>
               <a:t>Build the content using the components that we developed for you. We add new components with the new updates and</a:t>
             </a:r>
             <a:r>
-              <a:rPr lang="en-US" baseline="0" dirty="0" smtClean="0"/>
+              <a:rPr lang="en-US" baseline="0" dirty="0"/>
               <a:t> we improve some of the already existing components.</a:t>
             </a:r>
           </a:p>
           <a:p>
             <a:r>
-              <a:rPr lang="en-US" baseline="0" dirty="0" smtClean="0"/>
+              <a:rPr lang="en-US" baseline="0" dirty="0"/>
               <a:t>Creates groups with different permissions and then assign the users to specific groups in order to present different information to the users. </a:t>
             </a:r>
           </a:p>
           <a:p>
             <a:r>
-              <a:rPr lang="en-US" baseline="0" dirty="0" err="1" smtClean="0"/>
+              <a:rPr lang="en-US" baseline="0" dirty="0" err="1"/>
               <a:t>Qualtrics</a:t>
             </a:r>
             <a:r>
-              <a:rPr lang="en-US" baseline="0" dirty="0" smtClean="0"/>
+              <a:rPr lang="en-US" baseline="0" dirty="0"/>
               <a:t> is fully integrated and a survey can be loaded inside the webpage. Then the user does not need to move to another platform and come back to your study. All the data could be collected if needed and even more, the start or finish of a survey could trigger a task in </a:t>
             </a:r>
             <a:r>
-              <a:rPr lang="en-US" baseline="0" dirty="0" err="1" smtClean="0"/>
+              <a:rPr lang="en-US" baseline="0" dirty="0" err="1"/>
               <a:t>selfhelp</a:t>
             </a:r>
             <a:r>
-              <a:rPr lang="en-US" baseline="0" dirty="0" smtClean="0"/>
+              <a:rPr lang="en-US" baseline="0" dirty="0"/>
               <a:t> such as sending notification after specific time or assign the user to another group where he/she can have access to other pages. All these scheduling gives you the opportunity to design flexible and very customizable studies with multiple sessions. </a:t>
             </a:r>
           </a:p>
           <a:p>
             <a:r>
-              <a:rPr lang="en-US" baseline="0" dirty="0" smtClean="0"/>
+              <a:rPr lang="en-US" baseline="0" dirty="0"/>
               <a:t>With this experiment scheduling it is very easy to design a diary experiment for example. You can schedule notifications and add the user to a group where he/she can fill a questioner every night and send them reminders if they did not do it.</a:t>
             </a:r>
             <a:endParaRPr lang="de-CH" dirty="0"/>
@@ -1692,7 +1684,7 @@
   <p:clrMapOvr>
     <a:masterClrMapping/>
   </p:clrMapOvr>
-  <p:extLst mod="1">
+  <p:extLst>
     <p:ext uri="{DCECCB84-F9BA-43D5-87BE-67443E8EF086}">
       <p15:sldGuideLst xmlns:p15="http://schemas.microsoft.com/office/powerpoint/2012/main"/>
     </p:ext>
@@ -2255,7 +2247,7 @@
   <p:clrMapOvr>
     <a:masterClrMapping/>
   </p:clrMapOvr>
-  <p:extLst mod="1">
+  <p:extLst>
     <p:ext uri="{DCECCB84-F9BA-43D5-87BE-67443E8EF086}">
       <p15:sldGuideLst xmlns:p15="http://schemas.microsoft.com/office/powerpoint/2012/main"/>
     </p:ext>
@@ -3154,7 +3146,7 @@
   <p:clrMapOvr>
     <a:masterClrMapping/>
   </p:clrMapOvr>
-  <p:extLst mod="1">
+  <p:extLst>
     <p:ext uri="{DCECCB84-F9BA-43D5-87BE-67443E8EF086}">
       <p15:sldGuideLst xmlns:p15="http://schemas.microsoft.com/office/powerpoint/2012/main"/>
     </p:ext>
@@ -3681,7 +3673,7 @@
   <p:clrMapOvr>
     <a:masterClrMapping/>
   </p:clrMapOvr>
-  <p:extLst mod="1">
+  <p:extLst>
     <p:ext uri="{DCECCB84-F9BA-43D5-87BE-67443E8EF086}">
       <p15:sldGuideLst xmlns:p15="http://schemas.microsoft.com/office/powerpoint/2012/main"/>
     </p:ext>
@@ -4188,7 +4180,7 @@
   <p:clrMapOvr>
     <a:masterClrMapping/>
   </p:clrMapOvr>
-  <p:extLst mod="1">
+  <p:extLst>
     <p:ext uri="{DCECCB84-F9BA-43D5-87BE-67443E8EF086}">
       <p15:sldGuideLst xmlns:p15="http://schemas.microsoft.com/office/powerpoint/2012/main"/>
     </p:ext>
@@ -4728,7 +4720,7 @@
   <p:clrMapOvr>
     <a:masterClrMapping/>
   </p:clrMapOvr>
-  <p:extLst mod="1">
+  <p:extLst>
     <p:ext uri="{DCECCB84-F9BA-43D5-87BE-67443E8EF086}">
       <p15:sldGuideLst xmlns:p15="http://schemas.microsoft.com/office/powerpoint/2012/main"/>
     </p:ext>
@@ -5205,7 +5197,7 @@
   <p:clrMapOvr>
     <a:masterClrMapping/>
   </p:clrMapOvr>
-  <p:extLst mod="1">
+  <p:extLst>
     <p:ext uri="{DCECCB84-F9BA-43D5-87BE-67443E8EF086}">
       <p15:sldGuideLst xmlns:p15="http://schemas.microsoft.com/office/powerpoint/2012/main"/>
     </p:ext>
@@ -5734,7 +5726,7 @@
   <p:clrMapOvr>
     <a:masterClrMapping/>
   </p:clrMapOvr>
-  <p:extLst mod="1">
+  <p:extLst>
     <p:ext uri="{DCECCB84-F9BA-43D5-87BE-67443E8EF086}">
       <p15:sldGuideLst xmlns:p15="http://schemas.microsoft.com/office/powerpoint/2012/main"/>
     </p:ext>
@@ -6177,7 +6169,7 @@
   <p:clrMapOvr>
     <a:masterClrMapping/>
   </p:clrMapOvr>
-  <p:extLst mod="1">
+  <p:extLst>
     <p:ext uri="{DCECCB84-F9BA-43D5-87BE-67443E8EF086}">
       <p15:sldGuideLst xmlns:p15="http://schemas.microsoft.com/office/powerpoint/2012/main"/>
     </p:ext>
@@ -6523,7 +6515,7 @@
   <p:clrMapOvr>
     <a:masterClrMapping/>
   </p:clrMapOvr>
-  <p:extLst mod="1">
+  <p:extLst>
     <p:ext uri="{DCECCB84-F9BA-43D5-87BE-67443E8EF086}">
       <p15:sldGuideLst xmlns:p15="http://schemas.microsoft.com/office/powerpoint/2012/main"/>
     </p:ext>
@@ -6793,7 +6785,7 @@
   <p:clrMapOvr>
     <a:masterClrMapping/>
   </p:clrMapOvr>
-  <p:extLst mod="1">
+  <p:extLst>
     <p:ext uri="{DCECCB84-F9BA-43D5-87BE-67443E8EF086}">
       <p15:sldGuideLst xmlns:p15="http://schemas.microsoft.com/office/powerpoint/2012/main"/>
     </p:ext>
@@ -7152,7 +7144,7 @@
       </a:lvl9pPr>
     </p:otherStyle>
   </p:txStyles>
-  <p:extLst mod="1">
+  <p:extLst>
     <p:ext uri="{27BBF7A9-308A-43DC-89C8-2F10F3537804}">
       <p15:sldGuideLst xmlns:p15="http://schemas.microsoft.com/office/powerpoint/2012/main">
         <p15:guide id="1" orient="horz" pos="1620" userDrawn="1">
@@ -7567,7 +7559,7 @@
       </a:lvl9pPr>
     </p:otherStyle>
   </p:txStyles>
-  <p:extLst mod="1">
+  <p:extLst>
     <p:ext uri="{27BBF7A9-308A-43DC-89C8-2F10F3537804}">
       <p15:sldGuideLst xmlns:p15="http://schemas.microsoft.com/office/powerpoint/2012/main">
         <p15:guide id="1" orient="horz" pos="324" userDrawn="1">
@@ -8018,7 +8010,7 @@
       </a:lvl9pPr>
     </p:otherStyle>
   </p:txStyles>
-  <p:extLst mod="1">
+  <p:extLst>
     <p:ext uri="{27BBF7A9-308A-43DC-89C8-2F10F3537804}">
       <p15:sldGuideLst xmlns:p15="http://schemas.microsoft.com/office/powerpoint/2012/main">
         <p15:guide id="1" orient="horz" pos="1284" userDrawn="1">
@@ -8832,7 +8824,7 @@
       </a:lvl9pPr>
     </p:otherStyle>
   </p:txStyles>
-  <p:extLst mod="1">
+  <p:extLst>
     <p:ext uri="{27BBF7A9-308A-43DC-89C8-2F10F3537804}">
       <p15:sldGuideLst xmlns:p15="http://schemas.microsoft.com/office/powerpoint/2012/main">
         <p15:guide id="2" pos="336" userDrawn="1">
@@ -9620,7 +9612,7 @@
       </a:lvl9pPr>
     </p:otherStyle>
   </p:txStyles>
-  <p:extLst mod="1">
+  <p:extLst>
     <p:ext uri="{27BBF7A9-308A-43DC-89C8-2F10F3537804}">
       <p15:sldGuideLst xmlns:p15="http://schemas.microsoft.com/office/powerpoint/2012/main">
         <p15:guide id="2" pos="336">
@@ -10311,7 +10303,7 @@
       </a:lvl9pPr>
     </p:otherStyle>
   </p:txStyles>
-  <p:extLst mod="1">
+  <p:extLst>
     <p:ext uri="{27BBF7A9-308A-43DC-89C8-2F10F3537804}">
       <p15:sldGuideLst xmlns:p15="http://schemas.microsoft.com/office/powerpoint/2012/main">
         <p15:guide id="1" orient="horz" pos="324" userDrawn="1">
@@ -10387,10 +10379,9 @@
           <a:lstStyle/>
           <a:p>
             <a:r>
-              <a:rPr lang="de-DE" dirty="0" smtClean="0"/>
+              <a:rPr lang="de-DE" dirty="0"/>
               <a:t>SelfHelp</a:t>
             </a:r>
-            <a:endParaRPr lang="de-DE" dirty="0"/>
           </a:p>
         </p:txBody>
       </p:sp>
@@ -10419,7 +10410,7 @@
           <a:lstStyle/>
           <a:p>
             <a:r>
-              <a:rPr lang="en-US" dirty="0" smtClean="0"/>
+              <a:rPr lang="en-US" dirty="0"/>
               <a:t>Dr. Simon Maurer and Stefan Kodzhabashev</a:t>
             </a:r>
             <a:endParaRPr lang="de-CH" dirty="0"/>
@@ -10451,10 +10442,9 @@
           <a:lstStyle/>
           <a:p>
             <a:r>
-              <a:rPr lang="de-DE" dirty="0" smtClean="0"/>
+              <a:rPr lang="de-DE" dirty="0"/>
               <a:t>11.10.2021, Bern</a:t>
             </a:r>
-            <a:endParaRPr lang="de-DE" dirty="0"/>
           </a:p>
         </p:txBody>
       </p:sp>
@@ -10575,13 +10565,6 @@
   <p:clrMapOvr>
     <a:masterClrMapping/>
   </p:clrMapOvr>
-  <p:timing>
-    <p:tnLst>
-      <p:par>
-        <p:cTn id="1" dur="indefinite" restart="never" nodeType="tmRoot"/>
-      </p:par>
-    </p:tnLst>
-  </p:timing>
 </p:sld>
 </file>
 
@@ -10628,13 +10611,8 @@
           <a:p>
             <a:r>
               <a:rPr lang="de-DE" dirty="0"/>
-              <a:t>What is </a:t>
-            </a:r>
-            <a:r>
-              <a:rPr lang="de-DE" dirty="0" smtClean="0"/>
-              <a:t>SelfHelp?</a:t>
-            </a:r>
-            <a:endParaRPr lang="de-DE" dirty="0"/>
+              <a:t>What is SelfHelp?</a:t>
+            </a:r>
           </a:p>
         </p:txBody>
       </p:sp>
@@ -10670,28 +10648,7 @@
                 <a:latin typeface="Arial" panose="020B0604020202020204" pitchFamily="34" charset="0"/>
                 <a:cs typeface="Arial" panose="020B0604020202020204" pitchFamily="34" charset="0"/>
               </a:rPr>
-              <a:t>Started as </a:t>
-            </a:r>
-            <a:r>
-              <a:rPr lang="en-US" sz="2000" dirty="0" smtClean="0">
-                <a:latin typeface="Arial" panose="020B0604020202020204" pitchFamily="34" charset="0"/>
-                <a:cs typeface="Arial" panose="020B0604020202020204" pitchFamily="34" charset="0"/>
-              </a:rPr>
-              <a:t>a webpage </a:t>
-            </a:r>
-            <a:r>
-              <a:rPr lang="en-US" sz="2000" dirty="0">
-                <a:latin typeface="Arial" panose="020B0604020202020204" pitchFamily="34" charset="0"/>
-                <a:cs typeface="Arial" panose="020B0604020202020204" pitchFamily="34" charset="0"/>
-              </a:rPr>
-              <a:t>for self-aided </a:t>
-            </a:r>
-            <a:r>
-              <a:rPr lang="en-US" sz="2000" dirty="0" smtClean="0">
-                <a:latin typeface="Arial" panose="020B0604020202020204" pitchFamily="34" charset="0"/>
-                <a:cs typeface="Arial" panose="020B0604020202020204" pitchFamily="34" charset="0"/>
-              </a:rPr>
-              <a:t>therapy project</a:t>
+              <a:t>Started as a webpage for self-aided therapy project</a:t>
             </a:r>
           </a:p>
           <a:p>
@@ -10716,14 +10673,7 @@
                 <a:latin typeface="Arial" panose="020B0604020202020204" pitchFamily="34" charset="0"/>
                 <a:cs typeface="Arial" panose="020B0604020202020204" pitchFamily="34" charset="0"/>
               </a:rPr>
-              <a:t>Website building </a:t>
-            </a:r>
-            <a:r>
-              <a:rPr lang="de-DE" sz="2000" dirty="0" smtClean="0">
-                <a:latin typeface="Arial" panose="020B0604020202020204" pitchFamily="34" charset="0"/>
-                <a:cs typeface="Arial" panose="020B0604020202020204" pitchFamily="34" charset="0"/>
-              </a:rPr>
-              <a:t>platform</a:t>
+              <a:t>Website building platform</a:t>
             </a:r>
           </a:p>
           <a:p>
@@ -10744,30 +10694,26 @@
               <a:defRPr/>
             </a:pPr>
             <a:r>
-              <a:rPr lang="de-DE" sz="2000" dirty="0" smtClean="0">
+              <a:rPr lang="de-DE" sz="2000" dirty="0">
                 <a:latin typeface="Arial" panose="020B0604020202020204" pitchFamily="34" charset="0"/>
                 <a:cs typeface="Arial" panose="020B0604020202020204" pitchFamily="34" charset="0"/>
               </a:rPr>
               <a:t>OpenSource (</a:t>
             </a:r>
             <a:r>
-              <a:rPr lang="de-CH" sz="2000" dirty="0" smtClean="0">
+              <a:rPr lang="de-CH" sz="2000" dirty="0">
                 <a:latin typeface="Arial" panose="020B0604020202020204" pitchFamily="34" charset="0"/>
                 <a:cs typeface="Arial" panose="020B0604020202020204" pitchFamily="34" charset="0"/>
               </a:rPr>
               <a:t>MPL-2.0</a:t>
             </a:r>
             <a:r>
-              <a:rPr lang="de-DE" sz="2000" dirty="0" smtClean="0">
+              <a:rPr lang="de-DE" sz="2000" dirty="0">
                 <a:latin typeface="Arial" panose="020B0604020202020204" pitchFamily="34" charset="0"/>
                 <a:cs typeface="Arial" panose="020B0604020202020204" pitchFamily="34" charset="0"/>
               </a:rPr>
               <a:t>)</a:t>
             </a:r>
-            <a:endParaRPr lang="de-DE" sz="2000" dirty="0">
-              <a:latin typeface="Arial" panose="020B0604020202020204" pitchFamily="34" charset="0"/>
-              <a:cs typeface="Arial" panose="020B0604020202020204" pitchFamily="34" charset="0"/>
-            </a:endParaRPr>
           </a:p>
           <a:p>
             <a:endParaRPr lang="de-CH" sz="2000" dirty="0">
@@ -10868,13 +10814,6 @@
   <p:clrMapOvr>
     <a:masterClrMapping/>
   </p:clrMapOvr>
-  <p:timing>
-    <p:tnLst>
-      <p:par>
-        <p:cTn id="1" dur="indefinite" restart="never" nodeType="tmRoot"/>
-      </p:par>
-    </p:tnLst>
-  </p:timing>
 </p:sld>
 </file>
 
@@ -10921,13 +10860,8 @@
           <a:p>
             <a:r>
               <a:rPr lang="de-DE" dirty="0"/>
-              <a:t>Why </a:t>
-            </a:r>
-            <a:r>
-              <a:rPr lang="de-DE" dirty="0" smtClean="0"/>
-              <a:t>SelfHelp?</a:t>
-            </a:r>
-            <a:endParaRPr lang="de-DE" dirty="0"/>
+              <a:t>Why SelfHelp?</a:t>
+            </a:r>
           </a:p>
         </p:txBody>
       </p:sp>
@@ -10966,19 +10900,8 @@
                 <a:latin typeface="Arial" panose="020B0604020202020204" pitchFamily="34" charset="0"/>
                 <a:cs typeface="Arial" panose="020B0604020202020204" pitchFamily="34" charset="0"/>
               </a:rPr>
-              <a:t>Tailored to </a:t>
-            </a:r>
-            <a:r>
-              <a:rPr lang="en-US" sz="2000" dirty="0" smtClean="0">
-                <a:latin typeface="Arial" panose="020B0604020202020204" pitchFamily="34" charset="0"/>
-                <a:cs typeface="Arial" panose="020B0604020202020204" pitchFamily="34" charset="0"/>
-              </a:rPr>
-              <a:t>research</a:t>
-            </a:r>
-            <a:endParaRPr lang="en-US" sz="2000" dirty="0">
-              <a:latin typeface="Arial" panose="020B0604020202020204" pitchFamily="34" charset="0"/>
-              <a:cs typeface="Arial" panose="020B0604020202020204" pitchFamily="34" charset="0"/>
-            </a:endParaRPr>
+              <a:t>Tailored to research</a:t>
+            </a:r>
           </a:p>
           <a:p>
             <a:pPr marL="342900" lvl="0" indent="-342900">
@@ -10990,32 +10913,11 @@
               <a:defRPr/>
             </a:pPr>
             <a:r>
-              <a:rPr lang="en-US" sz="2000" dirty="0" smtClean="0">
-                <a:latin typeface="Arial" panose="020B0604020202020204" pitchFamily="34" charset="0"/>
-                <a:cs typeface="Arial" panose="020B0604020202020204" pitchFamily="34" charset="0"/>
-              </a:rPr>
-              <a:t>Tight </a:t>
-            </a:r>
-            <a:r>
               <a:rPr lang="en-US" sz="2000" dirty="0">
                 <a:latin typeface="Arial" panose="020B0604020202020204" pitchFamily="34" charset="0"/>
                 <a:cs typeface="Arial" panose="020B0604020202020204" pitchFamily="34" charset="0"/>
               </a:rPr>
-              <a:t>control over </a:t>
-            </a:r>
-            <a:r>
-              <a:rPr lang="en-US" sz="2000" dirty="0" smtClean="0">
-                <a:latin typeface="Arial" panose="020B0604020202020204" pitchFamily="34" charset="0"/>
-                <a:cs typeface="Arial" panose="020B0604020202020204" pitchFamily="34" charset="0"/>
-              </a:rPr>
-              <a:t>the </a:t>
-            </a:r>
-            <a:r>
-              <a:rPr lang="en-US" sz="2000" dirty="0">
-                <a:latin typeface="Arial" panose="020B0604020202020204" pitchFamily="34" charset="0"/>
-                <a:cs typeface="Arial" panose="020B0604020202020204" pitchFamily="34" charset="0"/>
-              </a:rPr>
-              <a:t>data</a:t>
+              <a:t>Tight control over the data</a:t>
             </a:r>
           </a:p>
           <a:p>
@@ -11028,18 +10930,11 @@
               <a:defRPr/>
             </a:pPr>
             <a:r>
-              <a:rPr lang="en-US" sz="2000" dirty="0" smtClean="0">
-                <a:latin typeface="Arial" panose="020B0604020202020204" pitchFamily="34" charset="0"/>
-                <a:cs typeface="Arial" panose="020B0604020202020204" pitchFamily="34" charset="0"/>
-              </a:rPr>
-              <a:t>No </a:t>
-            </a:r>
-            <a:r>
               <a:rPr lang="en-US" sz="2000" dirty="0">
                 <a:latin typeface="Arial" panose="020B0604020202020204" pitchFamily="34" charset="0"/>
                 <a:cs typeface="Arial" panose="020B0604020202020204" pitchFamily="34" charset="0"/>
               </a:rPr>
-              <a:t>programming skills needed</a:t>
+              <a:t>No programming skills needed</a:t>
             </a:r>
           </a:p>
           <a:p>
@@ -11052,18 +10947,11 @@
               <a:defRPr/>
             </a:pPr>
             <a:r>
-              <a:rPr lang="en-US" sz="2000" dirty="0" smtClean="0">
-                <a:latin typeface="Arial" panose="020B0604020202020204" pitchFamily="34" charset="0"/>
-                <a:cs typeface="Arial" panose="020B0604020202020204" pitchFamily="34" charset="0"/>
-              </a:rPr>
-              <a:t>Close </a:t>
-            </a:r>
-            <a:r>
               <a:rPr lang="en-US" sz="2000" dirty="0">
                 <a:latin typeface="Arial" panose="020B0604020202020204" pitchFamily="34" charset="0"/>
                 <a:cs typeface="Arial" panose="020B0604020202020204" pitchFamily="34" charset="0"/>
               </a:rPr>
-              <a:t>support by the TPF Team</a:t>
+              <a:t>Close support by the TPF Team</a:t>
             </a:r>
             <a:endParaRPr lang="de-CH" sz="2000" dirty="0">
               <a:latin typeface="Arial" panose="020B0604020202020204" pitchFamily="34" charset="0"/>
@@ -11150,13 +11038,6 @@
   <p:clrMapOvr>
     <a:masterClrMapping/>
   </p:clrMapOvr>
-  <p:timing>
-    <p:tnLst>
-      <p:par>
-        <p:cTn id="1" dur="indefinite" restart="never" nodeType="tmRoot"/>
-      </p:par>
-    </p:tnLst>
-  </p:timing>
 </p:sld>
 </file>
 
@@ -11202,14 +11083,9 @@
           <a:lstStyle/>
           <a:p>
             <a:r>
-              <a:rPr lang="de-DE" dirty="0" smtClean="0"/>
-              <a:t>When </a:t>
-            </a:r>
-            <a:r>
-              <a:rPr lang="de-DE" dirty="0" smtClean="0"/>
-              <a:t>to Use SelfHelp?</a:t>
-            </a:r>
-            <a:endParaRPr lang="de-DE" dirty="0"/>
+              <a:rPr lang="de-DE" dirty="0"/>
+              <a:t>When to Use SelfHelp?</a:t>
+            </a:r>
           </a:p>
         </p:txBody>
       </p:sp>
@@ -11281,7 +11157,7 @@
               <a:defRPr/>
             </a:pPr>
             <a:r>
-              <a:rPr lang="en-US" sz="2000" dirty="0" smtClean="0">
+              <a:rPr lang="en-US" sz="2000" dirty="0">
                 <a:latin typeface="Arial" panose="020B0604020202020204" pitchFamily="34" charset="0"/>
                 <a:cs typeface="Arial" panose="020B0604020202020204" pitchFamily="34" charset="0"/>
               </a:rPr>
@@ -11298,7 +11174,7 @@
               <a:defRPr/>
             </a:pPr>
             <a:r>
-              <a:rPr lang="en-US" sz="2000" dirty="0" smtClean="0">
+              <a:rPr lang="en-US" sz="2000" dirty="0">
                 <a:latin typeface="Arial" panose="020B0604020202020204" pitchFamily="34" charset="0"/>
                 <a:cs typeface="Arial" panose="020B0604020202020204" pitchFamily="34" charset="0"/>
               </a:rPr>
@@ -11315,7 +11191,7 @@
               <a:defRPr/>
             </a:pPr>
             <a:r>
-              <a:rPr lang="en-US" sz="2000" dirty="0" smtClean="0">
+              <a:rPr lang="en-US" sz="2000" dirty="0">
                 <a:latin typeface="Arial" panose="020B0604020202020204" pitchFamily="34" charset="0"/>
                 <a:cs typeface="Arial" panose="020B0604020202020204" pitchFamily="34" charset="0"/>
               </a:rPr>
@@ -11332,7 +11208,7 @@
               <a:defRPr/>
             </a:pPr>
             <a:r>
-              <a:rPr lang="en-US" sz="2000" dirty="0" smtClean="0">
+              <a:rPr lang="en-US" sz="2000" dirty="0">
                 <a:latin typeface="Arial" panose="020B0604020202020204" pitchFamily="34" charset="0"/>
                 <a:cs typeface="Arial" panose="020B0604020202020204" pitchFamily="34" charset="0"/>
               </a:rPr>
@@ -11349,7 +11225,7 @@
               <a:defRPr/>
             </a:pPr>
             <a:r>
-              <a:rPr lang="en-US" sz="2000" dirty="0" smtClean="0">
+              <a:rPr lang="en-US" sz="2000" dirty="0">
                 <a:latin typeface="Arial" panose="020B0604020202020204" pitchFamily="34" charset="0"/>
                 <a:cs typeface="Arial" panose="020B0604020202020204" pitchFamily="34" charset="0"/>
               </a:rPr>
@@ -11442,13 +11318,6 @@
   <p:clrMapOvr>
     <a:masterClrMapping/>
   </p:clrMapOvr>
-  <p:timing>
-    <p:tnLst>
-      <p:par>
-        <p:cTn id="1" dur="indefinite" restart="never" nodeType="tmRoot"/>
-      </p:par>
-    </p:tnLst>
-  </p:timing>
 </p:sld>
 </file>
 
@@ -11494,10 +11363,9 @@
           <a:lstStyle/>
           <a:p>
             <a:r>
-              <a:rPr lang="de-DE" dirty="0" smtClean="0"/>
+              <a:rPr lang="de-DE" dirty="0"/>
               <a:t>How to Use SelfHelp?</a:t>
             </a:r>
-            <a:endParaRPr lang="de-DE" dirty="0"/>
           </a:p>
         </p:txBody>
       </p:sp>
@@ -11532,18 +11400,11 @@
               <a:defRPr/>
             </a:pPr>
             <a:r>
-              <a:rPr lang="en-US" sz="2000" dirty="0" smtClean="0">
+              <a:rPr lang="en-US" sz="2000" dirty="0">
                 <a:latin typeface="Arial" panose="020B0604020202020204" pitchFamily="34" charset="0"/>
                 <a:cs typeface="Arial" panose="020B0604020202020204" pitchFamily="34" charset="0"/>
               </a:rPr>
-              <a:t>Building </a:t>
-            </a:r>
-            <a:r>
-              <a:rPr lang="en-US" sz="2000" dirty="0" smtClean="0">
-                <a:latin typeface="Arial" panose="020B0604020202020204" pitchFamily="34" charset="0"/>
-                <a:cs typeface="Arial" panose="020B0604020202020204" pitchFamily="34" charset="0"/>
-              </a:rPr>
-              <a:t>blocks</a:t>
+              <a:t>Building blocks</a:t>
             </a:r>
           </a:p>
           <a:p>
@@ -11556,16 +11417,12 @@
               <a:defRPr/>
             </a:pPr>
             <a:r>
-              <a:rPr lang="en-US" sz="2000" dirty="0" smtClean="0">
+              <a:rPr lang="en-US" sz="2000" dirty="0">
                 <a:latin typeface="Arial" panose="020B0604020202020204" pitchFamily="34" charset="0"/>
                 <a:cs typeface="Arial" panose="020B0604020202020204" pitchFamily="34" charset="0"/>
               </a:rPr>
               <a:t>Group &amp; user management</a:t>
             </a:r>
-            <a:endParaRPr lang="en-US" sz="2000" dirty="0" smtClean="0">
-              <a:latin typeface="Arial" panose="020B0604020202020204" pitchFamily="34" charset="0"/>
-              <a:cs typeface="Arial" panose="020B0604020202020204" pitchFamily="34" charset="0"/>
-            </a:endParaRPr>
           </a:p>
           <a:p>
             <a:pPr marL="342900" lvl="0" indent="-342900">
@@ -11577,14 +11434,14 @@
               <a:defRPr/>
             </a:pPr>
             <a:r>
-              <a:rPr lang="en-US" sz="2000" dirty="0" err="1" smtClean="0">
+              <a:rPr lang="en-US" sz="2000" dirty="0" err="1">
                 <a:latin typeface="Arial" panose="020B0604020202020204" pitchFamily="34" charset="0"/>
                 <a:cs typeface="Arial" panose="020B0604020202020204" pitchFamily="34" charset="0"/>
               </a:rPr>
               <a:t>Qualtrics</a:t>
             </a:r>
             <a:r>
-              <a:rPr lang="en-US" sz="2000" dirty="0" smtClean="0">
+              <a:rPr lang="en-US" sz="2000" dirty="0">
                 <a:latin typeface="Arial" panose="020B0604020202020204" pitchFamily="34" charset="0"/>
                 <a:cs typeface="Arial" panose="020B0604020202020204" pitchFamily="34" charset="0"/>
               </a:rPr>
@@ -11601,23 +11458,12 @@
               <a:defRPr/>
             </a:pPr>
             <a:r>
-              <a:rPr lang="en-US" sz="2000" dirty="0" smtClean="0">
+              <a:rPr lang="en-US" sz="2000" dirty="0">
                 <a:latin typeface="Arial" panose="020B0604020202020204" pitchFamily="34" charset="0"/>
                 <a:cs typeface="Arial" panose="020B0604020202020204" pitchFamily="34" charset="0"/>
               </a:rPr>
-              <a:t>Experiment </a:t>
-            </a:r>
-            <a:r>
-              <a:rPr lang="en-US" sz="2000" dirty="0" smtClean="0">
-                <a:latin typeface="Arial" panose="020B0604020202020204" pitchFamily="34" charset="0"/>
-                <a:cs typeface="Arial" panose="020B0604020202020204" pitchFamily="34" charset="0"/>
-              </a:rPr>
-              <a:t>scheduling</a:t>
-            </a:r>
-            <a:endParaRPr lang="en-US" sz="2000" dirty="0" smtClean="0">
-              <a:latin typeface="Arial" panose="020B0604020202020204" pitchFamily="34" charset="0"/>
-              <a:cs typeface="Arial" panose="020B0604020202020204" pitchFamily="34" charset="0"/>
-            </a:endParaRPr>
+              <a:t>Experiment scheduling</a:t>
+            </a:r>
           </a:p>
           <a:p>
             <a:pPr marL="342900" lvl="0" indent="-342900">
@@ -11628,7 +11474,7 @@
               <a:buChar char="§"/>
               <a:defRPr/>
             </a:pPr>
-            <a:endParaRPr lang="en-US" sz="2000" dirty="0" smtClean="0">
+            <a:endParaRPr lang="en-US" sz="2000" dirty="0">
               <a:latin typeface="Arial" panose="020B0604020202020204" pitchFamily="34" charset="0"/>
               <a:cs typeface="Arial" panose="020B0604020202020204" pitchFamily="34" charset="0"/>
             </a:endParaRPr>
@@ -11793,13 +11639,6 @@
   <p:clrMapOvr>
     <a:masterClrMapping/>
   </p:clrMapOvr>
-  <p:timing>
-    <p:tnLst>
-      <p:par>
-        <p:cTn id="1" dur="indefinite" restart="never" nodeType="tmRoot"/>
-      </p:par>
-    </p:tnLst>
-  </p:timing>
 </p:sld>
 </file>
 
@@ -11845,10 +11684,9 @@
           <a:lstStyle/>
           <a:p>
             <a:r>
-              <a:rPr lang="de-DE" dirty="0" smtClean="0"/>
+              <a:rPr lang="de-DE" dirty="0"/>
               <a:t>Wrap Up</a:t>
             </a:r>
-            <a:endParaRPr lang="de-DE" dirty="0"/>
           </a:p>
         </p:txBody>
       </p:sp>
@@ -11881,7 +11719,7 @@
               <a:defRPr/>
             </a:pPr>
             <a:r>
-              <a:rPr lang="en-US" sz="2000" dirty="0" smtClean="0">
+              <a:rPr lang="en-US" sz="2000" dirty="0">
                 <a:latin typeface="Arial" panose="020B0604020202020204" pitchFamily="34" charset="0"/>
                 <a:cs typeface="Arial" panose="020B0604020202020204" pitchFamily="34" charset="0"/>
               </a:rPr>
@@ -11898,7 +11736,7 @@
               <a:defRPr/>
             </a:pPr>
             <a:r>
-              <a:rPr lang="en-US" sz="2000" dirty="0" smtClean="0">
+              <a:rPr lang="en-US" sz="2000" dirty="0">
                 <a:latin typeface="Arial" panose="020B0604020202020204" pitchFamily="34" charset="0"/>
                 <a:cs typeface="Arial" panose="020B0604020202020204" pitchFamily="34" charset="0"/>
               </a:rPr>
@@ -11915,7 +11753,7 @@
               <a:defRPr/>
             </a:pPr>
             <a:r>
-              <a:rPr lang="en-US" sz="2000" dirty="0" smtClean="0">
+              <a:rPr lang="en-US" sz="2000" dirty="0">
                 <a:latin typeface="Arial" panose="020B0604020202020204" pitchFamily="34" charset="0"/>
                 <a:cs typeface="Arial" panose="020B0604020202020204" pitchFamily="34" charset="0"/>
               </a:rPr>
@@ -11932,7 +11770,7 @@
               <a:defRPr/>
             </a:pPr>
             <a:r>
-              <a:rPr lang="en-US" sz="2000" dirty="0" smtClean="0">
+              <a:rPr lang="en-US" sz="2000" dirty="0">
                 <a:latin typeface="Arial" panose="020B0604020202020204" pitchFamily="34" charset="0"/>
                 <a:cs typeface="Arial" panose="020B0604020202020204" pitchFamily="34" charset="0"/>
               </a:rPr>
@@ -11949,7 +11787,7 @@
               <a:defRPr/>
             </a:pPr>
             <a:r>
-              <a:rPr lang="en-US" sz="2000" dirty="0" smtClean="0">
+              <a:rPr lang="en-US" sz="2000" dirty="0">
                 <a:latin typeface="Arial" panose="020B0604020202020204" pitchFamily="34" charset="0"/>
                 <a:cs typeface="Arial" panose="020B0604020202020204" pitchFamily="34" charset="0"/>
               </a:rPr>
@@ -11987,7 +11825,7 @@
               <a:defRPr/>
             </a:pPr>
             <a:r>
-              <a:rPr lang="en-US" sz="2000" dirty="0" smtClean="0">
+              <a:rPr lang="en-US" sz="2000" dirty="0">
                 <a:latin typeface="Arial" panose="020B0604020202020204" pitchFamily="34" charset="0"/>
                 <a:cs typeface="Arial" panose="020B0604020202020204" pitchFamily="34" charset="0"/>
               </a:rPr>
@@ -12004,7 +11842,7 @@
               <a:defRPr/>
             </a:pPr>
             <a:r>
-              <a:rPr lang="en-US" sz="2000" dirty="0" smtClean="0">
+              <a:rPr lang="en-US" sz="2000" dirty="0">
                 <a:latin typeface="Arial" panose="020B0604020202020204" pitchFamily="34" charset="0"/>
                 <a:cs typeface="Arial" panose="020B0604020202020204" pitchFamily="34" charset="0"/>
               </a:rPr>
@@ -12021,14 +11859,14 @@
               <a:defRPr/>
             </a:pPr>
             <a:r>
-              <a:rPr lang="en-US" sz="2000" dirty="0" err="1" smtClean="0">
+              <a:rPr lang="en-US" sz="2000" dirty="0" err="1">
                 <a:latin typeface="Arial" panose="020B0604020202020204" pitchFamily="34" charset="0"/>
                 <a:cs typeface="Arial" panose="020B0604020202020204" pitchFamily="34" charset="0"/>
               </a:rPr>
               <a:t>REDCap</a:t>
             </a:r>
             <a:r>
-              <a:rPr lang="en-US" sz="2000" dirty="0" smtClean="0">
+              <a:rPr lang="en-US" sz="2000" dirty="0">
                 <a:latin typeface="Arial" panose="020B0604020202020204" pitchFamily="34" charset="0"/>
                 <a:cs typeface="Arial" panose="020B0604020202020204" pitchFamily="34" charset="0"/>
               </a:rPr>
@@ -12045,18 +11883,11 @@
               <a:defRPr/>
             </a:pPr>
             <a:r>
-              <a:rPr lang="en-US" sz="2000" dirty="0" smtClean="0">
+              <a:rPr lang="en-US" sz="2000" dirty="0">
                 <a:latin typeface="Arial" panose="020B0604020202020204" pitchFamily="34" charset="0"/>
                 <a:cs typeface="Arial" panose="020B0604020202020204" pitchFamily="34" charset="0"/>
               </a:rPr>
-              <a:t>Mobile </a:t>
-            </a:r>
-            <a:r>
-              <a:rPr lang="en-US" sz="2000" dirty="0" smtClean="0">
-                <a:latin typeface="Arial" panose="020B0604020202020204" pitchFamily="34" charset="0"/>
-                <a:cs typeface="Arial" panose="020B0604020202020204" pitchFamily="34" charset="0"/>
-              </a:rPr>
-              <a:t>features</a:t>
+              <a:t>Mobile features</a:t>
             </a:r>
           </a:p>
         </p:txBody>
@@ -12071,13 +11902,6 @@
   <p:clrMapOvr>
     <a:masterClrMapping/>
   </p:clrMapOvr>
-  <p:timing>
-    <p:tnLst>
-      <p:par>
-        <p:cTn id="1" dur="indefinite" restart="never" nodeType="tmRoot"/>
-      </p:par>
-    </p:tnLst>
-  </p:timing>
 </p:sld>
 </file>
 
@@ -12123,10 +11947,9 @@
           <a:lstStyle/>
           <a:p>
             <a:r>
-              <a:rPr lang="de-DE" dirty="0" smtClean="0"/>
+              <a:rPr lang="de-DE" dirty="0"/>
               <a:t>References</a:t>
             </a:r>
-            <a:endParaRPr lang="de-DE" dirty="0"/>
           </a:p>
         </p:txBody>
       </p:sp>
@@ -12166,17 +11989,9 @@
                 <a:cs typeface="Arial" panose="020B0604020202020204" pitchFamily="34" charset="0"/>
                 <a:hlinkClick r:id="rId3"/>
               </a:rPr>
-              <a:t>https://</a:t>
-            </a:r>
-            <a:r>
-              <a:rPr lang="en-US" sz="2000" dirty="0" smtClean="0">
-                <a:latin typeface="Arial" panose="020B0604020202020204" pitchFamily="34" charset="0"/>
-                <a:cs typeface="Arial" panose="020B0604020202020204" pitchFamily="34" charset="0"/>
-                <a:hlinkClick r:id="rId3"/>
-              </a:rPr>
-              <a:t>becccs.psy.unibe.ch</a:t>
-            </a:r>
-            <a:endParaRPr lang="en-US" sz="2000" dirty="0" smtClean="0">
+              <a:t>https://becccs.psy.unibe.ch</a:t>
+            </a:r>
+            <a:endParaRPr lang="en-US" sz="2000" dirty="0">
               <a:latin typeface="Arial" panose="020B0604020202020204" pitchFamily="34" charset="0"/>
               <a:cs typeface="Arial" panose="020B0604020202020204" pitchFamily="34" charset="0"/>
             </a:endParaRPr>
@@ -12196,15 +12011,7 @@
                 <a:cs typeface="Arial" panose="020B0604020202020204" pitchFamily="34" charset="0"/>
                 <a:hlinkClick r:id="rId4"/>
               </a:rPr>
-              <a:t>https://</a:t>
-            </a:r>
-            <a:r>
-              <a:rPr lang="en-US" sz="2000" dirty="0" smtClean="0">
-                <a:latin typeface="Arial" panose="020B0604020202020204" pitchFamily="34" charset="0"/>
-                <a:cs typeface="Arial" panose="020B0604020202020204" pitchFamily="34" charset="0"/>
-                <a:hlinkClick r:id="rId4"/>
-              </a:rPr>
-              <a:t>selfhelp1.psy.unibe.ch/unibrain</a:t>
+              <a:t>https://selfhelp1.psy.unibe.ch/unibrain</a:t>
             </a:r>
             <a:endParaRPr lang="en-US" sz="2000" dirty="0">
               <a:latin typeface="Arial" panose="020B0604020202020204" pitchFamily="34" charset="0"/>
@@ -12226,17 +12033,9 @@
                 <a:cs typeface="Arial" panose="020B0604020202020204" pitchFamily="34" charset="0"/>
                 <a:hlinkClick r:id="rId5"/>
               </a:rPr>
-              <a:t>https://</a:t>
-            </a:r>
-            <a:r>
-              <a:rPr lang="en-US" sz="2000" dirty="0" smtClean="0">
-                <a:latin typeface="Arial" panose="020B0604020202020204" pitchFamily="34" charset="0"/>
-                <a:cs typeface="Arial" panose="020B0604020202020204" pitchFamily="34" charset="0"/>
-                <a:hlinkClick r:id="rId5"/>
-              </a:rPr>
-              <a:t>www.spw.unibe.ch/tpf_selfhelp</a:t>
-            </a:r>
-            <a:endParaRPr lang="en-US" sz="2000" dirty="0" smtClean="0">
+              <a:t>https://www.spw.unibe.ch/tpf_selfhelp</a:t>
+            </a:r>
+            <a:endParaRPr lang="en-US" sz="2000" dirty="0">
               <a:latin typeface="Arial" panose="020B0604020202020204" pitchFamily="34" charset="0"/>
               <a:cs typeface="Arial" panose="020B0604020202020204" pitchFamily="34" charset="0"/>
             </a:endParaRPr>
@@ -12256,17 +12055,9 @@
                 <a:cs typeface="Arial" panose="020B0604020202020204" pitchFamily="34" charset="0"/>
                 <a:hlinkClick r:id="rId6"/>
               </a:rPr>
-              <a:t>https://</a:t>
-            </a:r>
-            <a:r>
-              <a:rPr lang="en-US" sz="2000" dirty="0" smtClean="0">
-                <a:latin typeface="Arial" panose="020B0604020202020204" pitchFamily="34" charset="0"/>
-                <a:cs typeface="Arial" panose="020B0604020202020204" pitchFamily="34" charset="0"/>
-                <a:hlinkClick r:id="rId6"/>
-              </a:rPr>
-              <a:t>dab-data.edu.unibe.ch</a:t>
-            </a:r>
-            <a:endParaRPr lang="en-US" sz="2000" dirty="0" smtClean="0">
+              <a:t>https://dab-data.edu.unibe.ch</a:t>
+            </a:r>
+            <a:endParaRPr lang="en-US" sz="2000" dirty="0">
               <a:latin typeface="Arial" panose="020B0604020202020204" pitchFamily="34" charset="0"/>
               <a:cs typeface="Arial" panose="020B0604020202020204" pitchFamily="34" charset="0"/>
             </a:endParaRPr>
@@ -12286,17 +12077,9 @@
                 <a:cs typeface="Arial" panose="020B0604020202020204" pitchFamily="34" charset="0"/>
                 <a:hlinkClick r:id="rId7"/>
               </a:rPr>
-              <a:t>https://</a:t>
-            </a:r>
-            <a:r>
-              <a:rPr lang="en-US" sz="2000" dirty="0" smtClean="0">
-                <a:latin typeface="Arial" panose="020B0604020202020204" pitchFamily="34" charset="0"/>
-                <a:cs typeface="Arial" panose="020B0604020202020204" pitchFamily="34" charset="0"/>
-                <a:hlinkClick r:id="rId7"/>
-              </a:rPr>
-              <a:t>selfhelp.psy.unibe.ch/sophie</a:t>
-            </a:r>
-            <a:endParaRPr lang="en-US" sz="2000" dirty="0" smtClean="0">
+              <a:t>https://selfhelp.psy.unibe.ch/sophie</a:t>
+            </a:r>
+            <a:endParaRPr lang="en-US" sz="2000" dirty="0">
               <a:latin typeface="Arial" panose="020B0604020202020204" pitchFamily="34" charset="0"/>
               <a:cs typeface="Arial" panose="020B0604020202020204" pitchFamily="34" charset="0"/>
             </a:endParaRPr>
@@ -12310,7 +12093,7 @@
               <a:buChar char="§"/>
               <a:defRPr/>
             </a:pPr>
-            <a:endParaRPr lang="en-US" sz="2000" dirty="0" smtClean="0">
+            <a:endParaRPr lang="en-US" sz="2000" dirty="0">
               <a:latin typeface="Arial" panose="020B0604020202020204" pitchFamily="34" charset="0"/>
               <a:cs typeface="Arial" panose="020B0604020202020204" pitchFamily="34" charset="0"/>
             </a:endParaRPr>
@@ -12327,13 +12110,6 @@
   <p:clrMapOvr>
     <a:masterClrMapping/>
   </p:clrMapOvr>
-  <p:timing>
-    <p:tnLst>
-      <p:par>
-        <p:cTn id="1" dur="indefinite" restart="never" nodeType="tmRoot"/>
-      </p:par>
-    </p:tnLst>
-  </p:timing>
 </p:sld>
 </file>
 
@@ -12379,7 +12155,7 @@
           <a:lstStyle/>
           <a:p>
             <a:r>
-              <a:rPr lang="de-CH" spc="-15" dirty="0" smtClean="0"/>
+              <a:rPr lang="de-CH" spc="-15" dirty="0"/>
               <a:t>Thank You</a:t>
             </a:r>
             <a:endParaRPr lang="de-DE" dirty="0"/>
@@ -12442,7 +12218,7 @@
           <a:lstStyle/>
           <a:p>
             <a:r>
-              <a:rPr lang="de-DE" dirty="0" smtClean="0"/>
+              <a:rPr lang="de-DE" dirty="0"/>
               <a:t>11.10.2021, </a:t>
             </a:r>
             <a:r>
@@ -12483,15 +12259,7 @@
                   <a:srgbClr val="231F20"/>
                 </a:solidFill>
               </a:rPr>
-              <a:t>f</a:t>
-            </a:r>
-            <a:r>
-              <a:rPr lang="de-CH" spc="20" dirty="0" smtClean="0">
-                <a:solidFill>
-                  <a:srgbClr val="231F20"/>
-                </a:solidFill>
-              </a:rPr>
-              <a:t>or your Attention</a:t>
+              <a:t>for your Attention</a:t>
             </a:r>
             <a:endParaRPr lang="de-DE" dirty="0"/>
           </a:p>
@@ -12542,13 +12310,6 @@
   <p:clrMapOvr>
     <a:masterClrMapping/>
   </p:clrMapOvr>
-  <p:timing>
-    <p:tnLst>
-      <p:par>
-        <p:cTn id="1" dur="indefinite" restart="never" nodeType="tmRoot"/>
-      </p:par>
-    </p:tnLst>
-  </p:timing>
 </p:sld>
 </file>
 

</xml_diff>